<commit_message>
added combined complaint/charging step
</commit_message>
<xml_diff>
--- a/macrDisclosure/img/arrestDataFlow.pptx
+++ b/macrDisclosure/img/arrestDataFlow.pptx
@@ -2972,7 +2972,7 @@
         </p:nvSpPr>
         <p:spPr>
           <a:xfrm>
-            <a:off x="361506" y="2684725"/>
+            <a:off x="244553" y="2684725"/>
             <a:ext cx="1796902" cy="1137683"/>
           </a:xfrm>
           <a:prstGeom prst="rect">
@@ -3013,7 +3013,7 @@
         </p:nvSpPr>
         <p:spPr>
           <a:xfrm>
-            <a:off x="3549501" y="843520"/>
+            <a:off x="3432548" y="843520"/>
             <a:ext cx="1796902" cy="1137683"/>
           </a:xfrm>
           <a:prstGeom prst="rect">
@@ -3054,7 +3054,7 @@
         </p:nvSpPr>
         <p:spPr>
           <a:xfrm>
-            <a:off x="3689876" y="4524635"/>
+            <a:off x="3572923" y="4524635"/>
             <a:ext cx="1796902" cy="1598428"/>
           </a:xfrm>
           <a:prstGeom prst="rect">
@@ -3095,7 +3095,7 @@
         </p:nvSpPr>
         <p:spPr>
           <a:xfrm>
-            <a:off x="3955310" y="2464098"/>
+            <a:off x="3838357" y="2464098"/>
             <a:ext cx="1616149" cy="1578935"/>
           </a:xfrm>
           <a:prstGeom prst="ellipse">
@@ -3139,7 +3139,7 @@
         </p:nvCxnSpPr>
         <p:spPr>
           <a:xfrm flipV="1">
-            <a:off x="2158408" y="1412362"/>
+            <a:off x="2041455" y="1412362"/>
             <a:ext cx="1391093" cy="1841205"/>
           </a:xfrm>
           <a:prstGeom prst="straightConnector1">
@@ -3175,7 +3175,7 @@
         </p:nvCxnSpPr>
         <p:spPr>
           <a:xfrm flipV="1">
-            <a:off x="2158408" y="3253566"/>
+            <a:off x="2041455" y="3253566"/>
             <a:ext cx="1796902" cy="1"/>
           </a:xfrm>
           <a:prstGeom prst="straightConnector1">
@@ -3211,7 +3211,7 @@
         </p:nvCxnSpPr>
         <p:spPr>
           <a:xfrm>
-            <a:off x="2158408" y="3253567"/>
+            <a:off x="2041455" y="3253567"/>
             <a:ext cx="1531468" cy="2070282"/>
           </a:xfrm>
           <a:prstGeom prst="straightConnector1">
@@ -3244,7 +3244,7 @@
         </p:nvSpPr>
         <p:spPr>
           <a:xfrm>
-            <a:off x="6841162" y="825802"/>
+            <a:off x="7344527" y="843520"/>
             <a:ext cx="1796902" cy="1137683"/>
           </a:xfrm>
           <a:prstGeom prst="rect">
@@ -3287,9 +3287,9 @@
           <p:nvPr/>
         </p:nvCxnSpPr>
         <p:spPr>
-          <a:xfrm flipV="1">
-            <a:off x="5346403" y="1394644"/>
-            <a:ext cx="1494759" cy="17718"/>
+          <a:xfrm>
+            <a:off x="5229450" y="1412362"/>
+            <a:ext cx="2115077" cy="0"/>
           </a:xfrm>
           <a:prstGeom prst="straightConnector1">
             <a:avLst/>
@@ -3321,7 +3321,7 @@
         </p:nvSpPr>
         <p:spPr>
           <a:xfrm>
-            <a:off x="6931538" y="2464099"/>
+            <a:off x="7434903" y="2481817"/>
             <a:ext cx="1616149" cy="1578935"/>
           </a:xfrm>
           <a:prstGeom prst="ellipse">
@@ -3365,8 +3365,8 @@
         </p:nvCxnSpPr>
         <p:spPr>
           <a:xfrm>
-            <a:off x="5346403" y="1412362"/>
-            <a:ext cx="1585135" cy="1841205"/>
+            <a:off x="5229450" y="1412362"/>
+            <a:ext cx="2205453" cy="1858923"/>
           </a:xfrm>
           <a:prstGeom prst="straightConnector1">
             <a:avLst/>
@@ -3400,7 +3400,7 @@
         </p:nvCxnSpPr>
         <p:spPr>
           <a:xfrm>
-            <a:off x="8638064" y="1394644"/>
+            <a:off x="9141429" y="1412362"/>
             <a:ext cx="1449571" cy="0"/>
           </a:xfrm>
           <a:prstGeom prst="straightConnector1">
@@ -3433,7 +3433,7 @@
         </p:nvSpPr>
         <p:spPr>
           <a:xfrm>
-            <a:off x="10132822" y="2464099"/>
+            <a:off x="10345479" y="2441008"/>
             <a:ext cx="1616149" cy="1578935"/>
           </a:xfrm>
           <a:prstGeom prst="ellipse">
@@ -3477,8 +3477,8 @@
         </p:nvCxnSpPr>
         <p:spPr>
           <a:xfrm>
-            <a:off x="8638064" y="1394644"/>
-            <a:ext cx="1494758" cy="1858923"/>
+            <a:off x="9141429" y="1412362"/>
+            <a:ext cx="1204050" cy="1818114"/>
           </a:xfrm>
           <a:prstGeom prst="straightConnector1">
             <a:avLst/>
@@ -3510,7 +3510,7 @@
         </p:nvSpPr>
         <p:spPr>
           <a:xfrm>
-            <a:off x="10132823" y="622892"/>
+            <a:off x="10345480" y="599801"/>
             <a:ext cx="1616149" cy="1578935"/>
           </a:xfrm>
           <a:prstGeom prst="ellipse">
@@ -3551,7 +3551,7 @@
         </p:nvSpPr>
         <p:spPr>
           <a:xfrm>
-            <a:off x="2284118" y="2093272"/>
+            <a:off x="2167165" y="2093272"/>
             <a:ext cx="1139671" cy="461665"/>
           </a:xfrm>
           <a:prstGeom prst="rect">
@@ -3584,7 +3584,7 @@
         </p:nvSpPr>
         <p:spPr>
           <a:xfrm>
-            <a:off x="2432795" y="3018768"/>
+            <a:off x="2315842" y="3018768"/>
             <a:ext cx="1272849" cy="461665"/>
           </a:xfrm>
           <a:prstGeom prst="rect">
@@ -3617,7 +3617,7 @@
         </p:nvSpPr>
         <p:spPr>
           <a:xfrm>
-            <a:off x="2284118" y="4024441"/>
+            <a:off x="2167165" y="4024441"/>
             <a:ext cx="1226490" cy="461665"/>
           </a:xfrm>
           <a:prstGeom prst="rect">
@@ -3650,8 +3650,8 @@
         </p:nvSpPr>
         <p:spPr>
           <a:xfrm>
-            <a:off x="5523603" y="1163809"/>
-            <a:ext cx="1153649" cy="461665"/>
+            <a:off x="5648802" y="887939"/>
+            <a:ext cx="1482768" cy="830997"/>
           </a:xfrm>
           <a:prstGeom prst="rect">
             <a:avLst/>
@@ -3663,14 +3663,22 @@
           </a:solidFill>
         </p:spPr>
         <p:txBody>
-          <a:bodyPr wrap="none" rtlCol="0">
+          <a:bodyPr wrap="square" rtlCol="0">
             <a:spAutoFit/>
           </a:bodyPr>
           <a:lstStyle/>
           <a:p>
+            <a:pPr algn="ctr"/>
             <a:r>
               <a:rPr lang="en-US" sz="2400" b="1" dirty="0"/>
-              <a:t>DA files</a:t>
+              <a:t>complaint </a:t>
+            </a:r>
+          </a:p>
+          <a:p>
+            <a:pPr algn="ctr"/>
+            <a:r>
+              <a:rPr lang="en-US" sz="2400" b="1" dirty="0"/>
+              <a:t>&amp; charged</a:t>
             </a:r>
           </a:p>
         </p:txBody>
@@ -3683,8 +3691,8 @@
         </p:nvSpPr>
         <p:spPr>
           <a:xfrm>
-            <a:off x="5486778" y="2085033"/>
-            <a:ext cx="1669816" cy="461665"/>
+            <a:off x="5465022" y="2025509"/>
+            <a:ext cx="1786386" cy="830997"/>
           </a:xfrm>
           <a:prstGeom prst="rect">
             <a:avLst/>
@@ -3701,6 +3709,14 @@
           </a:bodyPr>
           <a:lstStyle/>
           <a:p>
+            <a:pPr algn="ctr"/>
+            <a:r>
+              <a:rPr lang="en-US" sz="2400" b="1" dirty="0"/>
+              <a:t>complaint &amp;</a:t>
+            </a:r>
+          </a:p>
+          <a:p>
+            <a:pPr algn="ctr"/>
             <a:r>
               <a:rPr lang="en-US" sz="2400" b="1" dirty="0"/>
               <a:t>DA declines</a:t>
@@ -3716,7 +3732,7 @@
         </p:nvSpPr>
         <p:spPr>
           <a:xfrm>
-            <a:off x="9044352" y="1163809"/>
+            <a:off x="9345175" y="1140718"/>
             <a:ext cx="835485" cy="461665"/>
           </a:xfrm>
           <a:prstGeom prst="rect">
@@ -3749,7 +3765,7 @@
         </p:nvSpPr>
         <p:spPr>
           <a:xfrm>
-            <a:off x="8956188" y="2120054"/>
+            <a:off x="9360306" y="2185597"/>
             <a:ext cx="1011815" cy="461665"/>
           </a:xfrm>
           <a:prstGeom prst="rect">

</xml_diff>